<commit_message>
feat : add function for improve and standard pop
</commit_message>
<xml_diff>
--- a/داک پروژه.pptx
+++ b/داک پروژه.pptx
@@ -9,6 +9,8 @@
     <p:sldId id="257" r:id="rId3"/>
     <p:sldId id="258" r:id="rId4"/>
     <p:sldId id="259" r:id="rId5"/>
+    <p:sldId id="260" r:id="rId6"/>
+    <p:sldId id="261" r:id="rId7"/>
   </p:sldIdLst>
   <p:sldSz cx="12192000" cy="6858000"/>
   <p:notesSz cx="6858000" cy="9144000"/>
@@ -107,6 +109,11 @@
       </a:defRPr>
     </a:lvl9pPr>
   </p:defaultTextStyle>
+  <p:extLst>
+    <p:ext uri="{EFAFB233-063F-42B5-8137-9DF3F51BA10A}">
+      <p15:sldGuideLst xmlns:p15="http://schemas.microsoft.com/office/powerpoint/2012/main"/>
+    </p:ext>
+  </p:extLst>
 </p:presentation>
 </file>
 
@@ -257,7 +264,7 @@
           <a:p>
             <a:fld id="{728523FD-1807-47C0-9F1D-2703BF85B350}" type="datetimeFigureOut">
               <a:rPr lang="en-US" smtClean="0"/>
-              <a:t>5/11/2025</a:t>
+              <a:t>5/15/2025</a:t>
             </a:fld>
             <a:endParaRPr lang="en-US"/>
           </a:p>
@@ -455,7 +462,7 @@
           <a:p>
             <a:fld id="{728523FD-1807-47C0-9F1D-2703BF85B350}" type="datetimeFigureOut">
               <a:rPr lang="en-US" smtClean="0"/>
-              <a:t>5/11/2025</a:t>
+              <a:t>5/15/2025</a:t>
             </a:fld>
             <a:endParaRPr lang="en-US"/>
           </a:p>
@@ -663,7 +670,7 @@
           <a:p>
             <a:fld id="{728523FD-1807-47C0-9F1D-2703BF85B350}" type="datetimeFigureOut">
               <a:rPr lang="en-US" smtClean="0"/>
-              <a:t>5/11/2025</a:t>
+              <a:t>5/15/2025</a:t>
             </a:fld>
             <a:endParaRPr lang="en-US"/>
           </a:p>
@@ -861,7 +868,7 @@
           <a:p>
             <a:fld id="{728523FD-1807-47C0-9F1D-2703BF85B350}" type="datetimeFigureOut">
               <a:rPr lang="en-US" smtClean="0"/>
-              <a:t>5/11/2025</a:t>
+              <a:t>5/15/2025</a:t>
             </a:fld>
             <a:endParaRPr lang="en-US"/>
           </a:p>
@@ -1136,7 +1143,7 @@
           <a:p>
             <a:fld id="{728523FD-1807-47C0-9F1D-2703BF85B350}" type="datetimeFigureOut">
               <a:rPr lang="en-US" smtClean="0"/>
-              <a:t>5/11/2025</a:t>
+              <a:t>5/15/2025</a:t>
             </a:fld>
             <a:endParaRPr lang="en-US"/>
           </a:p>
@@ -1401,7 +1408,7 @@
           <a:p>
             <a:fld id="{728523FD-1807-47C0-9F1D-2703BF85B350}" type="datetimeFigureOut">
               <a:rPr lang="en-US" smtClean="0"/>
-              <a:t>5/11/2025</a:t>
+              <a:t>5/15/2025</a:t>
             </a:fld>
             <a:endParaRPr lang="en-US"/>
           </a:p>
@@ -1813,7 +1820,7 @@
           <a:p>
             <a:fld id="{728523FD-1807-47C0-9F1D-2703BF85B350}" type="datetimeFigureOut">
               <a:rPr lang="en-US" smtClean="0"/>
-              <a:t>5/11/2025</a:t>
+              <a:t>5/15/2025</a:t>
             </a:fld>
             <a:endParaRPr lang="en-US"/>
           </a:p>
@@ -1954,7 +1961,7 @@
           <a:p>
             <a:fld id="{728523FD-1807-47C0-9F1D-2703BF85B350}" type="datetimeFigureOut">
               <a:rPr lang="en-US" smtClean="0"/>
-              <a:t>5/11/2025</a:t>
+              <a:t>5/15/2025</a:t>
             </a:fld>
             <a:endParaRPr lang="en-US"/>
           </a:p>
@@ -2067,7 +2074,7 @@
           <a:p>
             <a:fld id="{728523FD-1807-47C0-9F1D-2703BF85B350}" type="datetimeFigureOut">
               <a:rPr lang="en-US" smtClean="0"/>
-              <a:t>5/11/2025</a:t>
+              <a:t>5/15/2025</a:t>
             </a:fld>
             <a:endParaRPr lang="en-US"/>
           </a:p>
@@ -2378,7 +2385,7 @@
           <a:p>
             <a:fld id="{728523FD-1807-47C0-9F1D-2703BF85B350}" type="datetimeFigureOut">
               <a:rPr lang="en-US" smtClean="0"/>
-              <a:t>5/11/2025</a:t>
+              <a:t>5/15/2025</a:t>
             </a:fld>
             <a:endParaRPr lang="en-US"/>
           </a:p>
@@ -2666,7 +2673,7 @@
           <a:p>
             <a:fld id="{728523FD-1807-47C0-9F1D-2703BF85B350}" type="datetimeFigureOut">
               <a:rPr lang="en-US" smtClean="0"/>
-              <a:t>5/11/2025</a:t>
+              <a:t>5/15/2025</a:t>
             </a:fld>
             <a:endParaRPr lang="en-US"/>
           </a:p>
@@ -2907,7 +2914,7 @@
           <a:p>
             <a:fld id="{728523FD-1807-47C0-9F1D-2703BF85B350}" type="datetimeFigureOut">
               <a:rPr lang="en-US" smtClean="0"/>
-              <a:t>5/11/2025</a:t>
+              <a:t>5/15/2025</a:t>
             </a:fld>
             <a:endParaRPr lang="en-US"/>
           </a:p>
@@ -3694,10 +3701,23 @@
           <a:p>
             <a:pPr algn="r" rtl="1"/>
             <a:r>
-              <a:rPr lang="fa-IR"/>
+              <a:rPr lang="fa-IR" dirty="0"/>
               <a:t>برای نسل بعدی به نسبت میزان خوب بودن فیتنس والد ها انتخاب شده اند</a:t>
             </a:r>
-            <a:endParaRPr lang="en-US"/>
+          </a:p>
+          <a:p>
+            <a:pPr algn="r" rtl="1"/>
+            <a:r>
+              <a:rPr lang="fa-IR" dirty="0"/>
+              <a:t>تعداد والد های انتخاب شده دوبرابر کل جمعیت است</a:t>
+            </a:r>
+          </a:p>
+          <a:p>
+            <a:pPr algn="r" rtl="1"/>
+            <a:r>
+              <a:rPr lang="fa-IR" dirty="0"/>
+              <a:t>هر دو والد یک فرزند به نسل جدید اضافه میکنند</a:t>
+            </a:r>
           </a:p>
         </p:txBody>
       </p:sp>
@@ -3705,6 +3725,182 @@
     <p:extLst>
       <p:ext uri="{BB962C8B-B14F-4D97-AF65-F5344CB8AC3E}">
         <p14:creationId xmlns:p14="http://schemas.microsoft.com/office/powerpoint/2010/main" val="2840534311"/>
+      </p:ext>
+    </p:extLst>
+  </p:cSld>
+  <p:clrMapOvr>
+    <a:masterClrMapping/>
+  </p:clrMapOvr>
+</p:sld>
+</file>
+
+<file path=ppt/slides/slide5.xml><?xml version="1.0" encoding="utf-8"?>
+<p:sld xmlns:a="http://schemas.openxmlformats.org/drawingml/2006/main" xmlns:r="http://schemas.openxmlformats.org/officeDocument/2006/relationships" xmlns:p="http://schemas.openxmlformats.org/presentationml/2006/main">
+  <p:cSld>
+    <p:spTree>
+      <p:nvGrpSpPr>
+        <p:cNvPr id="1" name=""/>
+        <p:cNvGrpSpPr/>
+        <p:nvPr/>
+      </p:nvGrpSpPr>
+      <p:grpSpPr>
+        <a:xfrm>
+          <a:off x="0" y="0"/>
+          <a:ext cx="0" cy="0"/>
+          <a:chOff x="0" y="0"/>
+          <a:chExt cx="0" cy="0"/>
+        </a:xfrm>
+      </p:grpSpPr>
+      <p:sp>
+        <p:nvSpPr>
+          <p:cNvPr id="2" name="Title 1">
+            <a:extLst>
+              <a:ext uri="{FF2B5EF4-FFF2-40B4-BE49-F238E27FC236}">
+                <a16:creationId xmlns:a16="http://schemas.microsoft.com/office/drawing/2014/main" id="{F340FF70-6788-457B-BA93-10D2623C4527}"/>
+              </a:ext>
+            </a:extLst>
+          </p:cNvPr>
+          <p:cNvSpPr>
+            <a:spLocks noGrp="1"/>
+          </p:cNvSpPr>
+          <p:nvPr>
+            <p:ph type="title"/>
+          </p:nvPr>
+        </p:nvSpPr>
+        <p:spPr/>
+        <p:txBody>
+          <a:bodyPr/>
+          <a:lstStyle/>
+          <a:p>
+            <a:r>
+              <a:rPr lang="en-US" dirty="0"/>
+              <a:t>crossover</a:t>
+            </a:r>
+          </a:p>
+        </p:txBody>
+      </p:sp>
+      <p:sp>
+        <p:nvSpPr>
+          <p:cNvPr id="3" name="Content Placeholder 2">
+            <a:extLst>
+              <a:ext uri="{FF2B5EF4-FFF2-40B4-BE49-F238E27FC236}">
+                <a16:creationId xmlns:a16="http://schemas.microsoft.com/office/drawing/2014/main" id="{D572B54A-F47B-465E-BF01-A11E66481739}"/>
+              </a:ext>
+            </a:extLst>
+          </p:cNvPr>
+          <p:cNvSpPr>
+            <a:spLocks noGrp="1"/>
+          </p:cNvSpPr>
+          <p:nvPr>
+            <p:ph idx="1"/>
+          </p:nvPr>
+        </p:nvSpPr>
+        <p:spPr/>
+        <p:txBody>
+          <a:bodyPr/>
+          <a:lstStyle/>
+          <a:p>
+            <a:pPr algn="ctr" rtl="1"/>
+            <a:r>
+              <a:rPr lang="fa-IR" dirty="0"/>
+              <a:t>از میان والد های انتخابی آنهایی را که بهتر هستند با نسبت بیشتری انتخاب میکنیدم و در این بخش چون دو معادله و دو مجهول است 4 فرزند دیگر را ساخته و بهترین را انتخاب میکنیم</a:t>
+            </a:r>
+            <a:endParaRPr lang="en-US" dirty="0"/>
+          </a:p>
+        </p:txBody>
+      </p:sp>
+    </p:spTree>
+    <p:extLst>
+      <p:ext uri="{BB962C8B-B14F-4D97-AF65-F5344CB8AC3E}">
+        <p14:creationId xmlns:p14="http://schemas.microsoft.com/office/powerpoint/2010/main" val="987783898"/>
+      </p:ext>
+    </p:extLst>
+  </p:cSld>
+  <p:clrMapOvr>
+    <a:masterClrMapping/>
+  </p:clrMapOvr>
+</p:sld>
+</file>
+
+<file path=ppt/slides/slide6.xml><?xml version="1.0" encoding="utf-8"?>
+<p:sld xmlns:a="http://schemas.openxmlformats.org/drawingml/2006/main" xmlns:r="http://schemas.openxmlformats.org/officeDocument/2006/relationships" xmlns:p="http://schemas.openxmlformats.org/presentationml/2006/main">
+  <p:cSld>
+    <p:spTree>
+      <p:nvGrpSpPr>
+        <p:cNvPr id="1" name=""/>
+        <p:cNvGrpSpPr/>
+        <p:nvPr/>
+      </p:nvGrpSpPr>
+      <p:grpSpPr>
+        <a:xfrm>
+          <a:off x="0" y="0"/>
+          <a:ext cx="0" cy="0"/>
+          <a:chOff x="0" y="0"/>
+          <a:chExt cx="0" cy="0"/>
+        </a:xfrm>
+      </p:grpSpPr>
+      <p:sp>
+        <p:nvSpPr>
+          <p:cNvPr id="2" name="Title 1">
+            <a:extLst>
+              <a:ext uri="{FF2B5EF4-FFF2-40B4-BE49-F238E27FC236}">
+                <a16:creationId xmlns:a16="http://schemas.microsoft.com/office/drawing/2014/main" id="{97160A0F-3613-41C1-91CE-8F2A8940314B}"/>
+              </a:ext>
+            </a:extLst>
+          </p:cNvPr>
+          <p:cNvSpPr>
+            <a:spLocks noGrp="1"/>
+          </p:cNvSpPr>
+          <p:nvPr>
+            <p:ph type="title"/>
+          </p:nvPr>
+        </p:nvSpPr>
+        <p:spPr/>
+        <p:txBody>
+          <a:bodyPr/>
+          <a:lstStyle/>
+          <a:p>
+            <a:r>
+              <a:rPr lang="en-US" dirty="0"/>
+              <a:t>mutation</a:t>
+            </a:r>
+          </a:p>
+        </p:txBody>
+      </p:sp>
+      <p:sp>
+        <p:nvSpPr>
+          <p:cNvPr id="3" name="Content Placeholder 2">
+            <a:extLst>
+              <a:ext uri="{FF2B5EF4-FFF2-40B4-BE49-F238E27FC236}">
+                <a16:creationId xmlns:a16="http://schemas.microsoft.com/office/drawing/2014/main" id="{11CCCF6E-BD08-489A-B2B9-3DEF57301DDE}"/>
+              </a:ext>
+            </a:extLst>
+          </p:cNvPr>
+          <p:cNvSpPr>
+            <a:spLocks noGrp="1"/>
+          </p:cNvSpPr>
+          <p:nvPr>
+            <p:ph idx="1"/>
+          </p:nvPr>
+        </p:nvSpPr>
+        <p:spPr/>
+        <p:txBody>
+          <a:bodyPr/>
+          <a:lstStyle/>
+          <a:p>
+            <a:pPr algn="r" rtl="1"/>
+            <a:r>
+              <a:rPr lang="fa-IR" dirty="0"/>
+              <a:t>به صورت احتمای</a:t>
+            </a:r>
+            <a:endParaRPr lang="en-US" dirty="0"/>
+          </a:p>
+        </p:txBody>
+      </p:sp>
+    </p:spTree>
+    <p:extLst>
+      <p:ext uri="{BB962C8B-B14F-4D97-AF65-F5344CB8AC3E}">
+        <p14:creationId xmlns:p14="http://schemas.microsoft.com/office/powerpoint/2010/main" val="714151039"/>
       </p:ext>
     </p:extLst>
   </p:cSld>

</xml_diff>